<commit_message>
Fix errors in Database access.
</commit_message>
<xml_diff>
--- a/docs/inside_avarkey.pptx
+++ b/docs/inside_avarkey.pptx
@@ -10134,15 +10134,7 @@
           <a:p>
             <a:r>
               <a:rPr lang="en-US" dirty="0"/>
-              <a:t>Database </a:t>
-            </a:r>
-            <a:r>
-              <a:rPr lang="en-US" dirty="0" err="1"/>
-              <a:t>partitial</a:t>
-            </a:r>
-            <a:r>
-              <a:rPr lang="en-US" dirty="0"/>
-              <a:t> overview</a:t>
+              <a:t>Database partial overview</a:t>
             </a:r>
           </a:p>
         </p:txBody>

</xml_diff>